<commit_message>
Added presentation for diploma seminar
</commit_message>
<xml_diff>
--- a/Presentations/diplomaSeminar/dipPresentation.pptx
+++ b/Presentations/diplomaSeminar/dipPresentation.pptx
@@ -13,6 +13,8 @@
     <p:sldId id="261" r:id="rId8"/>
     <p:sldId id="262" r:id="rId9"/>
     <p:sldId id="263" r:id="rId10"/>
+    <p:sldId id="264" r:id="rId11"/>
+    <p:sldId id="265" r:id="rId12"/>
   </p:sldIdLst>
   <p:sldSz cx="9144000" cy="6858000"/>
   <p:notesSz cx="7559675" cy="10691812"/>
@@ -1414,7 +1416,7 @@
         <p:spPr>
           <a:xfrm>
             <a:off x="2230200" y="2383200"/>
-            <a:ext cx="6157440" cy="1504440"/>
+            <a:ext cx="6157080" cy="1504080"/>
           </a:xfrm>
           <a:prstGeom prst="rect">
             <a:avLst/>
@@ -1429,7 +1431,7 @@
           <a:p>
             <a:pPr>
               <a:lnSpc>
-                <a:spcPts val="473"/>
+                <a:spcPts val="167"/>
               </a:lnSpc>
             </a:pPr>
             <a:r>
@@ -1454,7 +1456,7 @@
         <p:spPr>
           <a:xfrm>
             <a:off x="2230200" y="4175640"/>
-            <a:ext cx="6157440" cy="360000"/>
+            <a:ext cx="6157080" cy="359640"/>
           </a:xfrm>
           <a:prstGeom prst="rect">
             <a:avLst/>
@@ -1469,7 +1471,7 @@
           <a:p>
             <a:pPr>
               <a:lnSpc>
-                <a:spcPts val="298"/>
+                <a:spcPts val="105"/>
               </a:lnSpc>
             </a:pPr>
             <a:r>
@@ -1491,7 +1493,7 @@
         <p:spPr>
           <a:xfrm>
             <a:off x="2230560" y="5433840"/>
-            <a:ext cx="6157440" cy="839520"/>
+            <a:ext cx="6157080" cy="839160"/>
           </a:xfrm>
           <a:prstGeom prst="rect">
             <a:avLst/>
@@ -1515,7 +1517,7 @@
           <a:p>
             <a:pPr>
               <a:lnSpc>
-                <a:spcPts val="199"/>
+                <a:spcPts val="70"/>
               </a:lnSpc>
             </a:pPr>
             <a:r>
@@ -1529,7 +1531,7 @@
           <a:p>
             <a:pPr>
               <a:lnSpc>
-                <a:spcPts val="199"/>
+                <a:spcPts val="70"/>
               </a:lnSpc>
             </a:pPr>
             <a:endParaRPr/>
@@ -1537,7 +1539,7 @@
           <a:p>
             <a:pPr algn="r">
               <a:lnSpc>
-                <a:spcPts val="199"/>
+                <a:spcPts val="70"/>
               </a:lnSpc>
             </a:pPr>
             <a:r>
@@ -1559,7 +1561,7 @@
         <p:spPr>
           <a:xfrm>
             <a:off x="7631280" y="6611760"/>
-            <a:ext cx="1512360" cy="261000"/>
+            <a:ext cx="1512000" cy="260640"/>
           </a:xfrm>
           <a:prstGeom prst="rect">
             <a:avLst/>
@@ -1599,6 +1601,135 @@
           <p:childTnLst>
             <p:seq>
               <p:cTn id="2" nodeType="mainSeq"/>
+              <p:prevCondLst>
+                <p:cond delay="0" evt="onPrev">
+                  <p:tgtEl>
+                    <p:sldTgt/>
+                  </p:tgtEl>
+                </p:cond>
+              </p:prevCondLst>
+              <p:nextCondLst>
+                <p:cond delay="0" evt="onNext">
+                  <p:tgtEl>
+                    <p:sldTgt/>
+                  </p:tgtEl>
+                </p:cond>
+              </p:nextCondLst>
+            </p:seq>
+          </p:childTnLst>
+        </p:cTn>
+      </p:par>
+    </p:tnLst>
+  </p:timing>
+</p:sld>
+</file>
+
+<file path=ppt/slides/slide10.xml><?xml version="1.0" encoding="utf-8"?>
+<p:sld xmlns:a="http://schemas.openxmlformats.org/drawingml/2006/main" xmlns:p="http://schemas.openxmlformats.org/presentationml/2006/main" xmlns:r="http://schemas.openxmlformats.org/officeDocument/2006/relationships">
+  <p:cSld>
+    <p:spTree>
+      <p:nvGrpSpPr>
+        <p:cNvPr id="1" name=""/>
+        <p:cNvGrpSpPr/>
+        <p:nvPr/>
+      </p:nvGrpSpPr>
+      <p:grpSpPr>
+        <a:xfrm>
+          <a:off x="0" y="0"/>
+          <a:ext cx="0" cy="0"/>
+          <a:chOff x="0" y="0"/>
+          <a:chExt cx="0" cy="0"/>
+        </a:xfrm>
+      </p:grpSpPr>
+      <p:sp>
+        <p:nvSpPr>
+          <p:cNvPr id="64" name="CustomShape 1"/>
+          <p:cNvSpPr/>
+          <p:nvPr/>
+        </p:nvSpPr>
+        <p:spPr>
+          <a:xfrm>
+            <a:off x="1476000" y="789840"/>
+            <a:ext cx="7271640" cy="674280"/>
+          </a:xfrm>
+          <a:prstGeom prst="rect">
+            <a:avLst/>
+          </a:prstGeom>
+          <a:noFill/>
+          <a:ln>
+            <a:noFill/>
+          </a:ln>
+        </p:spPr>
+      </p:sp>
+      <p:sp>
+        <p:nvSpPr>
+          <p:cNvPr id="65" name="CustomShape 2"/>
+          <p:cNvSpPr/>
+          <p:nvPr/>
+        </p:nvSpPr>
+        <p:spPr>
+          <a:xfrm>
+            <a:off x="1476000" y="1628280"/>
+            <a:ext cx="7209720" cy="4496760"/>
+          </a:xfrm>
+          <a:prstGeom prst="rect">
+            <a:avLst/>
+          </a:prstGeom>
+          <a:noFill/>
+          <a:ln>
+            <a:noFill/>
+          </a:ln>
+        </p:spPr>
+      </p:sp>
+      <p:sp>
+        <p:nvSpPr>
+          <p:cNvPr id="66" name="CustomShape 3"/>
+          <p:cNvSpPr/>
+          <p:nvPr/>
+        </p:nvSpPr>
+        <p:spPr>
+          <a:xfrm>
+            <a:off x="7631280" y="6611760"/>
+            <a:ext cx="1512000" cy="260640"/>
+          </a:xfrm>
+          <a:prstGeom prst="rect">
+            <a:avLst/>
+          </a:prstGeom>
+          <a:noFill/>
+          <a:ln>
+            <a:noFill/>
+          </a:ln>
+        </p:spPr>
+        <p:txBody>
+          <a:bodyPr lIns="90000" rIns="90000" tIns="46800" bIns="46800"/>
+          <a:p>
+            <a:pPr>
+              <a:lnSpc>
+                <a:spcPct val="100000"/>
+              </a:lnSpc>
+            </a:pPr>
+            <a:r>
+              <a:rPr b="1" lang="pl-PL" sz="1100">
+                <a:solidFill>
+                  <a:srgbClr val="ffffff"/>
+                </a:solidFill>
+                <a:latin typeface="Verdana"/>
+              </a:rPr>
+              <a:t>www.agh.edu.pl</a:t>
+            </a:r>
+            <a:endParaRPr/>
+          </a:p>
+        </p:txBody>
+      </p:sp>
+    </p:spTree>
+  </p:cSld>
+  <p:timing>
+    <p:tnLst>
+      <p:par>
+        <p:cTn id="19" dur="indefinite" restart="never" nodeType="tmRoot">
+          <p:childTnLst>
+            <p:seq>
+              <p:cTn id="20" nodeType="mainSeq"/>
               <p:prevCondLst>
                 <p:cond delay="0" evt="onPrev">
                   <p:tgtEl>
@@ -1648,7 +1779,7 @@
         <p:spPr>
           <a:xfrm>
             <a:off x="1476000" y="836640"/>
-            <a:ext cx="7210080" cy="580680"/>
+            <a:ext cx="7209720" cy="580320"/>
           </a:xfrm>
           <a:prstGeom prst="rect">
             <a:avLst/>
@@ -1688,7 +1819,7 @@
         <p:spPr>
           <a:xfrm>
             <a:off x="1476000" y="1628280"/>
-            <a:ext cx="7210080" cy="4497120"/>
+            <a:ext cx="7209720" cy="4496760"/>
           </a:xfrm>
           <a:prstGeom prst="rect">
             <a:avLst/>
@@ -1701,38 +1832,61 @@
         <p:txBody>
           <a:bodyPr lIns="90000" rIns="90000" tIns="45000" bIns="45000"/>
           <a:p>
+            <a:pPr lvl="1">
+              <a:lnSpc>
+                <a:spcPct val="100000"/>
+              </a:lnSpc>
+              <a:buSzPct val="45000"/>
+              <a:buFont typeface="StarSymbol"/>
+              <a:buChar char=""/>
+            </a:pPr>
+            <a:r>
+              <a:rPr b="1" lang="pl-PL" sz="1600">
+                <a:latin typeface="Verdana"/>
+              </a:rPr>
+              <a:t>Trendy w branży rowerowej</a:t>
+            </a:r>
+            <a:endParaRPr/>
+          </a:p>
+          <a:p>
+            <a:pPr lvl="1">
+              <a:lnSpc>
+                <a:spcPct val="100000"/>
+              </a:lnSpc>
+              <a:buSzPct val="45000"/>
+              <a:buFont typeface="StarSymbol"/>
+              <a:buChar char=""/>
+            </a:pPr>
+            <a:r>
+              <a:rPr b="1" lang="pl-PL" sz="1600">
+                <a:latin typeface="Verdana"/>
+              </a:rPr>
+              <a:t>Cel pracy</a:t>
+            </a:r>
+            <a:endParaRPr/>
+          </a:p>
+          <a:p>
+            <a:pPr lvl="1">
+              <a:lnSpc>
+                <a:spcPct val="100000"/>
+              </a:lnSpc>
+              <a:buSzPct val="45000"/>
+              <a:buFont typeface="StarSymbol"/>
+              <a:buChar char=""/>
+            </a:pPr>
+            <a:r>
+              <a:rPr b="1" lang="pl-PL" sz="1600">
+                <a:latin typeface="Verdana"/>
+              </a:rPr>
+              <a:t>Założenia projektowe</a:t>
+            </a:r>
+            <a:endParaRPr/>
+          </a:p>
+          <a:p>
             <a:pPr>
-              <a:buSzPct val="45000"/>
-              <a:buFont typeface="StarSymbol"/>
-              <a:buChar char=""/>
-            </a:pPr>
-            <a:r>
-              <a:rPr b="1" lang="pl-PL" sz="1600">
-                <a:latin typeface="Verdana"/>
-              </a:rPr>
-              <a:t>Trendy w branży rowerowej</a:t>
-            </a:r>
-            <a:endParaRPr/>
-          </a:p>
-          <a:p>
-            <a:pPr>
-              <a:buSzPct val="45000"/>
-              <a:buFont typeface="StarSymbol"/>
-              <a:buChar char=""/>
-            </a:pPr>
-            <a:r>
-              <a:rPr b="1" lang="pl-PL" sz="1600">
-                <a:latin typeface="Verdana"/>
-              </a:rPr>
-              <a:t>Założenia projektowe</a:t>
-            </a:r>
-            <a:endParaRPr/>
-          </a:p>
-          <a:p>
-            <a:pPr>
-              <a:buSzPct val="45000"/>
-              <a:buFont typeface="StarSymbol"/>
-              <a:buChar char=""/>
+              <a:lnSpc>
+                <a:spcPct val="100000"/>
+              </a:lnSpc>
             </a:pPr>
             <a:endParaRPr/>
           </a:p>
@@ -1747,7 +1901,7 @@
         <p:spPr>
           <a:xfrm>
             <a:off x="7631280" y="6611760"/>
-            <a:ext cx="1512360" cy="261000"/>
+            <a:ext cx="1512000" cy="260640"/>
           </a:xfrm>
           <a:prstGeom prst="rect">
             <a:avLst/>
@@ -1836,7 +1990,7 @@
         <p:spPr>
           <a:xfrm>
             <a:off x="1476000" y="836640"/>
-            <a:ext cx="7210080" cy="580680"/>
+            <a:ext cx="7209720" cy="580320"/>
           </a:xfrm>
           <a:prstGeom prst="rect">
             <a:avLst/>
@@ -1876,7 +2030,7 @@
         <p:spPr>
           <a:xfrm>
             <a:off x="1476000" y="1628280"/>
-            <a:ext cx="7210080" cy="4497120"/>
+            <a:ext cx="7209720" cy="4496760"/>
           </a:xfrm>
           <a:prstGeom prst="rect">
             <a:avLst/>
@@ -1890,9 +2044,12 @@
           <a:bodyPr lIns="90000" rIns="90000" tIns="45000" bIns="45000"/>
           <a:p>
             <a:pPr>
-              <a:buSzPct val="45000"/>
-              <a:buFont typeface="StarSymbol"/>
-              <a:buChar char=""/>
+              <a:lnSpc>
+                <a:spcPct val="100000"/>
+              </a:lnSpc>
+              <a:buSzPct val="45000"/>
+              <a:buFont typeface="StarSymbol"/>
+              <a:buChar char="l"/>
             </a:pPr>
             <a:r>
               <a:rPr b="1" lang="pl-PL" sz="1600">
@@ -1904,9 +2061,12 @@
           </a:p>
           <a:p>
             <a:pPr>
-              <a:buSzPct val="45000"/>
-              <a:buFont typeface="StarSymbol"/>
-              <a:buChar char=""/>
+              <a:lnSpc>
+                <a:spcPct val="100000"/>
+              </a:lnSpc>
+              <a:buSzPct val="45000"/>
+              <a:buFont typeface="StarSymbol"/>
+              <a:buChar char="l"/>
             </a:pPr>
             <a:r>
               <a:rPr b="1" lang="pl-PL" sz="1600">
@@ -1918,9 +2078,12 @@
           </a:p>
           <a:p>
             <a:pPr>
-              <a:buSzPct val="45000"/>
-              <a:buFont typeface="StarSymbol"/>
-              <a:buChar char=""/>
+              <a:lnSpc>
+                <a:spcPct val="100000"/>
+              </a:lnSpc>
+              <a:buSzPct val="45000"/>
+              <a:buFont typeface="StarSymbol"/>
+              <a:buChar char="l"/>
             </a:pPr>
             <a:r>
               <a:rPr b="1" lang="pl-PL" sz="1600">
@@ -1932,9 +2095,12 @@
           </a:p>
           <a:p>
             <a:pPr>
-              <a:buSzPct val="45000"/>
-              <a:buFont typeface="StarSymbol"/>
-              <a:buChar char=""/>
+              <a:lnSpc>
+                <a:spcPct val="100000"/>
+              </a:lnSpc>
+              <a:buSzPct val="45000"/>
+              <a:buFont typeface="StarSymbol"/>
+              <a:buChar char="l"/>
             </a:pPr>
             <a:r>
               <a:rPr b="1" lang="pl-PL" sz="1600">
@@ -1946,9 +2112,12 @@
           </a:p>
           <a:p>
             <a:pPr>
-              <a:buSzPct val="45000"/>
-              <a:buFont typeface="StarSymbol"/>
-              <a:buChar char=""/>
+              <a:lnSpc>
+                <a:spcPct val="100000"/>
+              </a:lnSpc>
+              <a:buSzPct val="45000"/>
+              <a:buFont typeface="StarSymbol"/>
+              <a:buChar char="l"/>
             </a:pPr>
             <a:r>
               <a:rPr b="1" lang="pl-PL" sz="1600">
@@ -1960,9 +2129,9 @@
           </a:p>
           <a:p>
             <a:pPr>
-              <a:buSzPct val="45000"/>
-              <a:buFont typeface="StarSymbol"/>
-              <a:buChar char=""/>
+              <a:lnSpc>
+                <a:spcPct val="100000"/>
+              </a:lnSpc>
             </a:pPr>
             <a:endParaRPr/>
           </a:p>
@@ -1977,7 +2146,7 @@
         <p:spPr>
           <a:xfrm>
             <a:off x="7631280" y="6611760"/>
-            <a:ext cx="1512360" cy="261000"/>
+            <a:ext cx="1512000" cy="260640"/>
           </a:xfrm>
           <a:prstGeom prst="rect">
             <a:avLst/>
@@ -2072,7 +2241,7 @@
         <p:spPr>
           <a:xfrm>
             <a:off x="2088000" y="2278800"/>
-            <a:ext cx="5612760" cy="3013200"/>
+            <a:ext cx="5612400" cy="3012840"/>
           </a:xfrm>
           <a:prstGeom prst="rect">
             <a:avLst/>
@@ -2084,18 +2253,22 @@
       </p:pic>
       <p:sp>
         <p:nvSpPr>
-          <p:cNvPr id="47" name="TextShape 1"/>
-          <p:cNvSpPr txBox="1"/>
+          <p:cNvPr id="47" name="CustomShape 1"/>
+          <p:cNvSpPr/>
           <p:nvPr/>
         </p:nvSpPr>
         <p:spPr>
           <a:xfrm>
             <a:off x="2520000" y="951120"/>
-            <a:ext cx="4509000" cy="416880"/>
-          </a:xfrm>
-          <a:prstGeom prst="rect">
-            <a:avLst/>
-          </a:prstGeom>
+            <a:ext cx="4508640" cy="416520"/>
+          </a:xfrm>
+          <a:prstGeom prst="rect">
+            <a:avLst/>
+          </a:prstGeom>
+          <a:noFill/>
+          <a:ln>
+            <a:noFill/>
+          </a:ln>
         </p:spPr>
         <p:txBody>
           <a:bodyPr lIns="90000" rIns="90000" tIns="45000" bIns="45000"/>
@@ -2176,7 +2349,7 @@
         <p:spPr>
           <a:xfrm>
             <a:off x="1476000" y="836640"/>
-            <a:ext cx="7210080" cy="580680"/>
+            <a:ext cx="7209720" cy="580320"/>
           </a:xfrm>
           <a:prstGeom prst="rect">
             <a:avLst/>
@@ -2216,7 +2389,7 @@
         <p:spPr>
           <a:xfrm>
             <a:off x="1476000" y="1628280"/>
-            <a:ext cx="7210080" cy="4497120"/>
+            <a:ext cx="7209720" cy="4496760"/>
           </a:xfrm>
           <a:prstGeom prst="rect">
             <a:avLst/>
@@ -2236,7 +2409,7 @@
         <p:spPr>
           <a:xfrm>
             <a:off x="7631280" y="6611760"/>
-            <a:ext cx="1512360" cy="261000"/>
+            <a:ext cx="1512000" cy="260640"/>
           </a:xfrm>
           <a:prstGeom prst="rect">
             <a:avLst/>
@@ -2282,7 +2455,7 @@
         <p:spPr>
           <a:xfrm>
             <a:off x="2146680" y="1988280"/>
-            <a:ext cx="5701320" cy="4131720"/>
+            <a:ext cx="5700960" cy="4131360"/>
           </a:xfrm>
           <a:prstGeom prst="rect">
             <a:avLst/>
@@ -2350,7 +2523,7 @@
         <p:spPr>
           <a:xfrm>
             <a:off x="1476000" y="836640"/>
-            <a:ext cx="7210080" cy="580680"/>
+            <a:ext cx="7209720" cy="580320"/>
           </a:xfrm>
           <a:prstGeom prst="rect">
             <a:avLst/>
@@ -2390,7 +2563,7 @@
         <p:spPr>
           <a:xfrm>
             <a:off x="1476000" y="1628280"/>
-            <a:ext cx="7210080" cy="4497120"/>
+            <a:ext cx="7209720" cy="4496760"/>
           </a:xfrm>
           <a:prstGeom prst="rect">
             <a:avLst/>
@@ -2404,9 +2577,12 @@
           <a:bodyPr lIns="90000" rIns="90000" tIns="45000" bIns="45000"/>
           <a:p>
             <a:pPr>
-              <a:buSzPct val="45000"/>
-              <a:buFont typeface="StarSymbol"/>
-              <a:buChar char=""/>
+              <a:lnSpc>
+                <a:spcPct val="100000"/>
+              </a:lnSpc>
+              <a:buSzPct val="45000"/>
+              <a:buFont typeface="StarSymbol"/>
+              <a:buChar char="l"/>
             </a:pPr>
             <a:r>
               <a:rPr b="1" lang="pl-PL" sz="1600">
@@ -2418,9 +2594,12 @@
           </a:p>
           <a:p>
             <a:pPr>
-              <a:buSzPct val="45000"/>
-              <a:buFont typeface="StarSymbol"/>
-              <a:buChar char=""/>
+              <a:lnSpc>
+                <a:spcPct val="100000"/>
+              </a:lnSpc>
+              <a:buSzPct val="45000"/>
+              <a:buFont typeface="StarSymbol"/>
+              <a:buChar char="l"/>
             </a:pPr>
             <a:r>
               <a:rPr b="1" lang="pl-PL" sz="1600">
@@ -2432,9 +2611,12 @@
           </a:p>
           <a:p>
             <a:pPr>
-              <a:buSzPct val="45000"/>
-              <a:buFont typeface="StarSymbol"/>
-              <a:buChar char=""/>
+              <a:lnSpc>
+                <a:spcPct val="100000"/>
+              </a:lnSpc>
+              <a:buSzPct val="45000"/>
+              <a:buFont typeface="StarSymbol"/>
+              <a:buChar char="l"/>
             </a:pPr>
             <a:r>
               <a:rPr b="1" lang="pl-PL" sz="1600">
@@ -2446,9 +2628,12 @@
           </a:p>
           <a:p>
             <a:pPr>
-              <a:buSzPct val="45000"/>
-              <a:buFont typeface="StarSymbol"/>
-              <a:buChar char=""/>
+              <a:lnSpc>
+                <a:spcPct val="100000"/>
+              </a:lnSpc>
+              <a:buSzPct val="45000"/>
+              <a:buFont typeface="StarSymbol"/>
+              <a:buChar char="l"/>
             </a:pPr>
             <a:r>
               <a:rPr b="1" lang="pl-PL" sz="1600">
@@ -2460,9 +2645,12 @@
           </a:p>
           <a:p>
             <a:pPr>
-              <a:buSzPct val="45000"/>
-              <a:buFont typeface="StarSymbol"/>
-              <a:buChar char=""/>
+              <a:lnSpc>
+                <a:spcPct val="100000"/>
+              </a:lnSpc>
+              <a:buSzPct val="45000"/>
+              <a:buFont typeface="StarSymbol"/>
+              <a:buChar char="l"/>
             </a:pPr>
             <a:r>
               <a:rPr b="1" lang="pl-PL" sz="1600">
@@ -2474,9 +2662,12 @@
           </a:p>
           <a:p>
             <a:pPr>
-              <a:buSzPct val="45000"/>
-              <a:buFont typeface="StarSymbol"/>
-              <a:buChar char=""/>
+              <a:lnSpc>
+                <a:spcPct val="100000"/>
+              </a:lnSpc>
+              <a:buSzPct val="45000"/>
+              <a:buFont typeface="StarSymbol"/>
+              <a:buChar char="l"/>
             </a:pPr>
             <a:r>
               <a:rPr b="1" lang="pl-PL" sz="1600">
@@ -2488,9 +2679,12 @@
           </a:p>
           <a:p>
             <a:pPr>
-              <a:buSzPct val="45000"/>
-              <a:buFont typeface="StarSymbol"/>
-              <a:buChar char=""/>
+              <a:lnSpc>
+                <a:spcPct val="100000"/>
+              </a:lnSpc>
+              <a:buSzPct val="45000"/>
+              <a:buFont typeface="StarSymbol"/>
+              <a:buChar char="l"/>
             </a:pPr>
             <a:r>
               <a:rPr b="1" lang="pl-PL" sz="1600">
@@ -2502,9 +2696,9 @@
           </a:p>
           <a:p>
             <a:pPr>
-              <a:buSzPct val="45000"/>
-              <a:buFont typeface="StarSymbol"/>
-              <a:buChar char=""/>
+              <a:lnSpc>
+                <a:spcPct val="100000"/>
+              </a:lnSpc>
             </a:pPr>
             <a:endParaRPr/>
           </a:p>
@@ -2519,7 +2713,7 @@
         <p:spPr>
           <a:xfrm>
             <a:off x="7631280" y="6611760"/>
-            <a:ext cx="1512360" cy="261000"/>
+            <a:ext cx="1512000" cy="260640"/>
           </a:xfrm>
           <a:prstGeom prst="rect">
             <a:avLst/>
@@ -2608,7 +2802,7 @@
         <p:spPr>
           <a:xfrm>
             <a:off x="1476000" y="836640"/>
-            <a:ext cx="7210080" cy="580680"/>
+            <a:ext cx="7209720" cy="580320"/>
           </a:xfrm>
           <a:prstGeom prst="rect">
             <a:avLst/>
@@ -2633,7 +2827,7 @@
                 </a:solidFill>
                 <a:latin typeface="Verdana"/>
               </a:rPr>
-              <a:t>Założenia projektowe</a:t>
+              <a:t>Cel pracy</a:t>
             </a:r>
             <a:endParaRPr/>
           </a:p>
@@ -2648,7 +2842,7 @@
         <p:spPr>
           <a:xfrm>
             <a:off x="1476000" y="1628280"/>
-            <a:ext cx="7210080" cy="4497120"/>
+            <a:ext cx="7209720" cy="4496760"/>
           </a:xfrm>
           <a:prstGeom prst="rect">
             <a:avLst/>
@@ -2661,108 +2855,106 @@
         <p:txBody>
           <a:bodyPr lIns="90000" rIns="90000" tIns="45000" bIns="45000"/>
           <a:p>
+            <a:pPr lvl="1">
+              <a:lnSpc>
+                <a:spcPct val="100000"/>
+              </a:lnSpc>
+              <a:buSzPct val="45000"/>
+              <a:buFont typeface="StarSymbol"/>
+              <a:buChar char=""/>
+            </a:pPr>
+            <a:r>
+              <a:rPr b="1" lang="pl-PL" sz="1600">
+                <a:latin typeface="Verdana"/>
+              </a:rPr>
+              <a:t>Opracowanie i wykonanie mechaniczno – elektronicznego systemu do zmiany przełożeń </a:t>
+            </a:r>
+            <a:endParaRPr/>
+          </a:p>
+          <a:p>
+            <a:pPr lvl="1">
+              <a:lnSpc>
+                <a:spcPct val="100000"/>
+              </a:lnSpc>
+              <a:buSzPct val="45000"/>
+              <a:buFont typeface="StarSymbol"/>
+              <a:buChar char=""/>
+            </a:pPr>
+            <a:r>
+              <a:rPr b="1" lang="pl-PL" sz="1600">
+                <a:latin typeface="Verdana"/>
+              </a:rPr>
+              <a:t>Wykonanie układu sterującego przerzutką, który umożliwia dwa tryby pracy:</a:t>
+            </a:r>
+            <a:endParaRPr/>
+          </a:p>
+          <a:p>
+            <a:pPr lvl="3">
+              <a:lnSpc>
+                <a:spcPct val="100000"/>
+              </a:lnSpc>
+              <a:buSzPct val="45000"/>
+              <a:buFont typeface="StarSymbol"/>
+              <a:buChar char=""/>
+            </a:pPr>
+            <a:r>
+              <a:rPr b="1" lang="pl-PL" sz="1600">
+                <a:latin typeface="Verdana"/>
+              </a:rPr>
+              <a:t>Tryb manualny</a:t>
+            </a:r>
+            <a:endParaRPr/>
+          </a:p>
+          <a:p>
+            <a:pPr lvl="3">
+              <a:lnSpc>
+                <a:spcPct val="100000"/>
+              </a:lnSpc>
+              <a:buSzPct val="45000"/>
+              <a:buFont typeface="StarSymbol"/>
+              <a:buChar char=""/>
+            </a:pPr>
+            <a:r>
+              <a:rPr b="1" lang="pl-PL" sz="1600">
+                <a:latin typeface="Verdana"/>
+              </a:rPr>
+              <a:t>Tryb automatyczny</a:t>
+            </a:r>
+            <a:endParaRPr/>
+          </a:p>
+          <a:p>
+            <a:pPr lvl="3">
+              <a:lnSpc>
+                <a:spcPct val="100000"/>
+              </a:lnSpc>
+              <a:buSzPct val="45000"/>
+              <a:buFont typeface="StarSymbol"/>
+              <a:buChar char=""/>
+            </a:pPr>
+            <a:endParaRPr/>
+          </a:p>
+          <a:p>
+            <a:pPr lvl="1">
+              <a:lnSpc>
+                <a:spcPct val="100000"/>
+              </a:lnSpc>
+              <a:buSzPct val="45000"/>
+              <a:buFont typeface="StarSymbol"/>
+              <a:buChar char=""/>
+            </a:pPr>
+            <a:r>
+              <a:rPr b="1" lang="pl-PL" sz="1600">
+                <a:latin typeface="Verdana"/>
+              </a:rPr>
+              <a:t>W trybie automatycznym układ umożliwia profilowanie charakterystyki zmiany przełożeń</a:t>
+            </a:r>
+            <a:endParaRPr/>
+          </a:p>
+          <a:p>
             <a:pPr>
-              <a:buSzPct val="45000"/>
-              <a:buFont typeface="StarSymbol"/>
-              <a:buChar char=""/>
-            </a:pPr>
-            <a:r>
-              <a:rPr b="1" lang="pl-PL" sz="1600">
-                <a:latin typeface="Verdana"/>
-              </a:rPr>
-              <a:t>Płynność i szybkość zmiany przełożeń</a:t>
-            </a:r>
-            <a:endParaRPr/>
-          </a:p>
-          <a:p>
-            <a:pPr>
-              <a:buSzPct val="45000"/>
-              <a:buFont typeface="StarSymbol"/>
-              <a:buChar char=""/>
-            </a:pPr>
-            <a:r>
-              <a:rPr b="1" lang="pl-PL" sz="1600">
-                <a:latin typeface="Verdana"/>
-              </a:rPr>
-              <a:t>Precyzja</a:t>
-            </a:r>
-            <a:endParaRPr/>
-          </a:p>
-          <a:p>
-            <a:pPr>
-              <a:buSzPct val="45000"/>
-              <a:buFont typeface="StarSymbol"/>
-              <a:buChar char=""/>
-            </a:pPr>
-            <a:r>
-              <a:rPr b="1" lang="pl-PL" sz="1600">
-                <a:latin typeface="Verdana"/>
-              </a:rPr>
-              <a:t>Niezawodność i powtarzalność działania</a:t>
-            </a:r>
-            <a:endParaRPr/>
-          </a:p>
-          <a:p>
-            <a:pPr>
-              <a:buSzPct val="45000"/>
-              <a:buFont typeface="StarSymbol"/>
-              <a:buChar char=""/>
-            </a:pPr>
-            <a:r>
-              <a:rPr b="1" lang="pl-PL" sz="1600">
-                <a:latin typeface="Verdana"/>
-              </a:rPr>
-              <a:t>Automatyczna kalibracja</a:t>
-            </a:r>
-            <a:endParaRPr/>
-          </a:p>
-          <a:p>
-            <a:pPr>
-              <a:buSzPct val="45000"/>
-              <a:buFont typeface="StarSymbol"/>
-              <a:buChar char=""/>
-            </a:pPr>
-            <a:r>
-              <a:rPr b="1" lang="pl-PL" sz="1600">
-                <a:latin typeface="Verdana"/>
-              </a:rPr>
-              <a:t>Zmiana kilku przełożeń naraz</a:t>
-            </a:r>
-            <a:endParaRPr/>
-          </a:p>
-          <a:p>
-            <a:pPr>
-              <a:buSzPct val="45000"/>
-              <a:buFont typeface="StarSymbol"/>
-              <a:buChar char=""/>
-            </a:pPr>
-            <a:r>
-              <a:rPr b="1" lang="pl-PL" sz="1600">
-                <a:latin typeface="Verdana"/>
-              </a:rPr>
-              <a:t>Odporność na niekorzystne warunki atmosferyczne</a:t>
-            </a:r>
-            <a:endParaRPr/>
-          </a:p>
-          <a:p>
-            <a:pPr>
-              <a:buSzPct val="45000"/>
-              <a:buFont typeface="StarSymbol"/>
-              <a:buChar char=""/>
-            </a:pPr>
-            <a:r>
-              <a:rPr b="1" lang="pl-PL" sz="1600">
-                <a:latin typeface="Verdana"/>
-              </a:rPr>
-              <a:t>Personalizacja charakterystyki zmiany przełożeń</a:t>
-            </a:r>
-            <a:endParaRPr/>
-          </a:p>
-          <a:p>
-            <a:pPr>
-              <a:buSzPct val="45000"/>
-              <a:buFont typeface="StarSymbol"/>
-              <a:buChar char=""/>
+              <a:lnSpc>
+                <a:spcPct val="100000"/>
+              </a:lnSpc>
             </a:pPr>
             <a:endParaRPr/>
           </a:p>
@@ -2777,7 +2969,7 @@
         <p:spPr>
           <a:xfrm>
             <a:off x="7631280" y="6611760"/>
-            <a:ext cx="1512360" cy="261000"/>
+            <a:ext cx="1512000" cy="260640"/>
           </a:xfrm>
           <a:prstGeom prst="rect">
             <a:avLst/>
@@ -2865,8 +3057,8 @@
         </p:nvSpPr>
         <p:spPr>
           <a:xfrm>
-            <a:off x="1476000" y="789840"/>
-            <a:ext cx="7272000" cy="674640"/>
+            <a:off x="1476000" y="836640"/>
+            <a:ext cx="7209720" cy="580320"/>
           </a:xfrm>
           <a:prstGeom prst="rect">
             <a:avLst/>
@@ -2876,6 +3068,26 @@
             <a:noFill/>
           </a:ln>
         </p:spPr>
+        <p:txBody>
+          <a:bodyPr lIns="90000" rIns="90000" tIns="45000" bIns="45000" anchor="ctr"/>
+          <a:p>
+            <a:pPr>
+              <a:lnSpc>
+                <a:spcPct val="100000"/>
+              </a:lnSpc>
+            </a:pPr>
+            <a:r>
+              <a:rPr b="1" lang="pl-PL" sz="2200">
+                <a:solidFill>
+                  <a:srgbClr val="000000"/>
+                </a:solidFill>
+                <a:latin typeface="Verdana"/>
+              </a:rPr>
+              <a:t>Wykorzystane podzespoły</a:t>
+            </a:r>
+            <a:endParaRPr/>
+          </a:p>
+        </p:txBody>
       </p:sp>
       <p:sp>
         <p:nvSpPr>
@@ -2886,7 +3098,7 @@
         <p:spPr>
           <a:xfrm>
             <a:off x="1476000" y="1628280"/>
-            <a:ext cx="7210080" cy="4497120"/>
+            <a:ext cx="7209720" cy="4496760"/>
           </a:xfrm>
           <a:prstGeom prst="rect">
             <a:avLst/>
@@ -2896,6 +3108,181 @@
             <a:noFill/>
           </a:ln>
         </p:spPr>
+        <p:txBody>
+          <a:bodyPr lIns="90000" rIns="90000" tIns="45000" bIns="45000"/>
+          <a:p>
+            <a:pPr lvl="1">
+              <a:lnSpc>
+                <a:spcPct val="100000"/>
+              </a:lnSpc>
+              <a:buSzPct val="45000"/>
+              <a:buFont typeface="StarSymbol"/>
+              <a:buChar char=""/>
+            </a:pPr>
+            <a:r>
+              <a:rPr b="1" lang="pl-PL" sz="1600">
+                <a:latin typeface="Verdana"/>
+              </a:rPr>
+              <a:t>Mikrokontroler TI  TM4C123GH6PM</a:t>
+            </a:r>
+            <a:endParaRPr/>
+          </a:p>
+          <a:p>
+            <a:pPr lvl="1">
+              <a:lnSpc>
+                <a:spcPct val="100000"/>
+              </a:lnSpc>
+              <a:buSzPct val="45000"/>
+              <a:buFont typeface="StarSymbol"/>
+              <a:buChar char=""/>
+            </a:pPr>
+            <a:r>
+              <a:rPr b="1" lang="pl-PL" sz="1600">
+                <a:latin typeface="Verdana"/>
+              </a:rPr>
+              <a:t>Zestaw czujników:</a:t>
+            </a:r>
+            <a:endParaRPr/>
+          </a:p>
+          <a:p>
+            <a:pPr lvl="2">
+              <a:lnSpc>
+                <a:spcPct val="100000"/>
+              </a:lnSpc>
+              <a:buSzPct val="45000"/>
+              <a:buFont typeface="StarSymbol"/>
+              <a:buChar char=""/>
+            </a:pPr>
+            <a:r>
+              <a:rPr b="1" lang="pl-PL" sz="1600">
+                <a:latin typeface="Verdana"/>
+              </a:rPr>
+              <a:t>Akcelerometr</a:t>
+            </a:r>
+            <a:endParaRPr/>
+          </a:p>
+          <a:p>
+            <a:pPr lvl="2">
+              <a:lnSpc>
+                <a:spcPct val="100000"/>
+              </a:lnSpc>
+              <a:buSzPct val="45000"/>
+              <a:buFont typeface="StarSymbol"/>
+              <a:buChar char=""/>
+            </a:pPr>
+            <a:r>
+              <a:rPr b="1" lang="pl-PL" sz="1600">
+                <a:latin typeface="Verdana"/>
+              </a:rPr>
+              <a:t>Czujniki magnetyczne</a:t>
+            </a:r>
+            <a:r>
+              <a:rPr b="1" lang="pl-PL" sz="1600">
+                <a:latin typeface="Verdana"/>
+              </a:rPr>
+              <a:t>	</a:t>
+            </a:r>
+            <a:endParaRPr/>
+          </a:p>
+          <a:p>
+            <a:pPr lvl="1">
+              <a:lnSpc>
+                <a:spcPct val="100000"/>
+              </a:lnSpc>
+              <a:buSzPct val="45000"/>
+              <a:buFont typeface="StarSymbol"/>
+              <a:buChar char=""/>
+            </a:pPr>
+            <a:r>
+              <a:rPr b="1" lang="pl-PL" sz="1600">
+                <a:latin typeface="Verdana"/>
+              </a:rPr>
+              <a:t>Serwomechanizm HiTech </a:t>
+            </a:r>
+            <a:endParaRPr/>
+          </a:p>
+          <a:p>
+            <a:pPr lvl="1">
+              <a:lnSpc>
+                <a:spcPct val="100000"/>
+              </a:lnSpc>
+              <a:buSzPct val="45000"/>
+              <a:buFont typeface="StarSymbol"/>
+              <a:buChar char=""/>
+            </a:pPr>
+            <a:r>
+              <a:rPr b="1" lang="pl-PL" sz="1600">
+                <a:latin typeface="Verdana"/>
+              </a:rPr>
+              <a:t>Przetwornica stepdown</a:t>
+            </a:r>
+            <a:endParaRPr/>
+          </a:p>
+          <a:p>
+            <a:pPr lvl="1">
+              <a:lnSpc>
+                <a:spcPct val="100000"/>
+              </a:lnSpc>
+              <a:buSzPct val="45000"/>
+              <a:buFont typeface="StarSymbol"/>
+              <a:buChar char=""/>
+            </a:pPr>
+            <a:r>
+              <a:rPr b="1" lang="pl-PL" sz="1600">
+                <a:latin typeface="Verdana"/>
+              </a:rPr>
+              <a:t>Akumulator litowo polimerowy </a:t>
+            </a:r>
+            <a:endParaRPr/>
+          </a:p>
+          <a:p>
+            <a:pPr lvl="1">
+              <a:lnSpc>
+                <a:spcPct val="100000"/>
+              </a:lnSpc>
+              <a:buSzPct val="45000"/>
+              <a:buFont typeface="StarSymbol"/>
+              <a:buChar char=""/>
+            </a:pPr>
+            <a:r>
+              <a:rPr b="1" lang="pl-PL" sz="1600">
+                <a:latin typeface="Verdana"/>
+              </a:rPr>
+              <a:t>Dedykowany obwód drukowany</a:t>
+            </a:r>
+            <a:endParaRPr/>
+          </a:p>
+          <a:p>
+            <a:pPr lvl="2">
+              <a:lnSpc>
+                <a:spcPct val="100000"/>
+              </a:lnSpc>
+              <a:buSzPct val="45000"/>
+              <a:buFont typeface="StarSymbol"/>
+              <a:buChar char=""/>
+            </a:pPr>
+            <a:endParaRPr/>
+          </a:p>
+          <a:p>
+            <a:pPr lvl="2">
+              <a:lnSpc>
+                <a:spcPct val="100000"/>
+              </a:lnSpc>
+              <a:buSzPct val="45000"/>
+              <a:buFont typeface="StarSymbol"/>
+              <a:buChar char=""/>
+            </a:pPr>
+            <a:endParaRPr/>
+          </a:p>
+          <a:p>
+            <a:pPr>
+              <a:lnSpc>
+                <a:spcPct val="100000"/>
+              </a:lnSpc>
+            </a:pPr>
+            <a:endParaRPr/>
+          </a:p>
+        </p:txBody>
       </p:sp>
       <p:sp>
         <p:nvSpPr>
@@ -2906,7 +3293,7 @@
         <p:spPr>
           <a:xfrm>
             <a:off x="7631280" y="6611760"/>
-            <a:ext cx="1512360" cy="261000"/>
+            <a:ext cx="1512000" cy="260640"/>
           </a:xfrm>
           <a:prstGeom prst="rect">
             <a:avLst/>
@@ -2946,6 +3333,324 @@
           <p:childTnLst>
             <p:seq>
               <p:cTn id="16" nodeType="mainSeq"/>
+              <p:prevCondLst>
+                <p:cond delay="0" evt="onPrev">
+                  <p:tgtEl>
+                    <p:sldTgt/>
+                  </p:tgtEl>
+                </p:cond>
+              </p:prevCondLst>
+              <p:nextCondLst>
+                <p:cond delay="0" evt="onNext">
+                  <p:tgtEl>
+                    <p:sldTgt/>
+                  </p:tgtEl>
+                </p:cond>
+              </p:nextCondLst>
+            </p:seq>
+          </p:childTnLst>
+        </p:cTn>
+      </p:par>
+    </p:tnLst>
+  </p:timing>
+</p:sld>
+</file>
+
+<file path=ppt/slides/slide9.xml><?xml version="1.0" encoding="utf-8"?>
+<p:sld xmlns:a="http://schemas.openxmlformats.org/drawingml/2006/main" xmlns:p="http://schemas.openxmlformats.org/presentationml/2006/main" xmlns:r="http://schemas.openxmlformats.org/officeDocument/2006/relationships">
+  <p:cSld>
+    <p:spTree>
+      <p:nvGrpSpPr>
+        <p:cNvPr id="1" name=""/>
+        <p:cNvGrpSpPr/>
+        <p:nvPr/>
+      </p:nvGrpSpPr>
+      <p:grpSpPr>
+        <a:xfrm>
+          <a:off x="0" y="0"/>
+          <a:ext cx="0" cy="0"/>
+          <a:chOff x="0" y="0"/>
+          <a:chExt cx="0" cy="0"/>
+        </a:xfrm>
+      </p:grpSpPr>
+      <p:sp>
+        <p:nvSpPr>
+          <p:cNvPr id="61" name="CustomShape 1"/>
+          <p:cNvSpPr/>
+          <p:nvPr/>
+        </p:nvSpPr>
+        <p:spPr>
+          <a:xfrm>
+            <a:off x="1476000" y="836640"/>
+            <a:ext cx="7209720" cy="580320"/>
+          </a:xfrm>
+          <a:prstGeom prst="rect">
+            <a:avLst/>
+          </a:prstGeom>
+          <a:noFill/>
+          <a:ln>
+            <a:noFill/>
+          </a:ln>
+        </p:spPr>
+        <p:txBody>
+          <a:bodyPr lIns="90000" rIns="90000" tIns="45000" bIns="45000" anchor="ctr"/>
+          <a:p>
+            <a:pPr>
+              <a:lnSpc>
+                <a:spcPct val="100000"/>
+              </a:lnSpc>
+            </a:pPr>
+            <a:r>
+              <a:rPr b="1" lang="pl-PL" sz="2200">
+                <a:solidFill>
+                  <a:srgbClr val="000000"/>
+                </a:solidFill>
+                <a:latin typeface="Verdana"/>
+              </a:rPr>
+              <a:t>Kilka kolarskich </a:t>
+            </a:r>
+            <a:endParaRPr/>
+          </a:p>
+        </p:txBody>
+      </p:sp>
+      <p:sp>
+        <p:nvSpPr>
+          <p:cNvPr id="62" name="CustomShape 2"/>
+          <p:cNvSpPr/>
+          <p:nvPr/>
+        </p:nvSpPr>
+        <p:spPr>
+          <a:xfrm>
+            <a:off x="1476000" y="1628280"/>
+            <a:ext cx="7209720" cy="4496760"/>
+          </a:xfrm>
+          <a:prstGeom prst="rect">
+            <a:avLst/>
+          </a:prstGeom>
+          <a:noFill/>
+          <a:ln>
+            <a:noFill/>
+          </a:ln>
+        </p:spPr>
+        <p:txBody>
+          <a:bodyPr lIns="90000" rIns="90000" tIns="45000" bIns="45000"/>
+          <a:p>
+            <a:pPr lvl="1">
+              <a:lnSpc>
+                <a:spcPct val="100000"/>
+              </a:lnSpc>
+              <a:buSzPct val="45000"/>
+              <a:buFont typeface="StarSymbol"/>
+              <a:buChar char=""/>
+            </a:pPr>
+            <a:r>
+              <a:rPr b="1" lang="pl-PL" sz="1600">
+                <a:latin typeface="Verdana"/>
+              </a:rPr>
+              <a:t>Mikrokontroler TI  TM4C123GH6PM</a:t>
+            </a:r>
+            <a:endParaRPr/>
+          </a:p>
+          <a:p>
+            <a:pPr lvl="1">
+              <a:lnSpc>
+                <a:spcPct val="100000"/>
+              </a:lnSpc>
+              <a:buSzPct val="45000"/>
+              <a:buFont typeface="StarSymbol"/>
+              <a:buChar char=""/>
+            </a:pPr>
+            <a:r>
+              <a:rPr b="1" lang="pl-PL" sz="1600">
+                <a:latin typeface="Verdana"/>
+              </a:rPr>
+              <a:t>Zestaw czujników:</a:t>
+            </a:r>
+            <a:endParaRPr/>
+          </a:p>
+          <a:p>
+            <a:pPr lvl="2">
+              <a:lnSpc>
+                <a:spcPct val="100000"/>
+              </a:lnSpc>
+              <a:buSzPct val="45000"/>
+              <a:buFont typeface="StarSymbol"/>
+              <a:buChar char=""/>
+            </a:pPr>
+            <a:endParaRPr/>
+          </a:p>
+          <a:p>
+            <a:pPr lvl="2">
+              <a:lnSpc>
+                <a:spcPct val="100000"/>
+              </a:lnSpc>
+              <a:buSzPct val="45000"/>
+              <a:buFont typeface="StarSymbol"/>
+              <a:buChar char=""/>
+            </a:pPr>
+            <a:r>
+              <a:rPr b="1" lang="pl-PL" sz="1600">
+                <a:latin typeface="Verdana"/>
+              </a:rPr>
+              <a:t>Czujniki magnetyczne</a:t>
+            </a:r>
+            <a:r>
+              <a:rPr b="1" lang="pl-PL" sz="1600">
+                <a:latin typeface="Verdana"/>
+              </a:rPr>
+              <a:t>	</a:t>
+            </a:r>
+            <a:endParaRPr/>
+          </a:p>
+          <a:p>
+            <a:pPr lvl="1">
+              <a:lnSpc>
+                <a:spcPct val="100000"/>
+              </a:lnSpc>
+              <a:buSzPct val="45000"/>
+              <a:buFont typeface="StarSymbol"/>
+              <a:buChar char=""/>
+            </a:pPr>
+            <a:r>
+              <a:rPr b="1" lang="pl-PL" sz="1600">
+                <a:latin typeface="Verdana"/>
+              </a:rPr>
+              <a:t>Serwomechanizm HiTech </a:t>
+            </a:r>
+            <a:endParaRPr/>
+          </a:p>
+          <a:p>
+            <a:pPr lvl="1">
+              <a:lnSpc>
+                <a:spcPct val="100000"/>
+              </a:lnSpc>
+              <a:buSzPct val="45000"/>
+              <a:buFont typeface="StarSymbol"/>
+              <a:buChar char=""/>
+            </a:pPr>
+            <a:r>
+              <a:rPr b="1" lang="pl-PL" sz="1600">
+                <a:latin typeface="Verdana"/>
+              </a:rPr>
+              <a:t>Przetwornica stepdown</a:t>
+            </a:r>
+            <a:endParaRPr/>
+          </a:p>
+          <a:p>
+            <a:pPr lvl="1">
+              <a:lnSpc>
+                <a:spcPct val="100000"/>
+              </a:lnSpc>
+              <a:buSzPct val="45000"/>
+              <a:buFont typeface="StarSymbol"/>
+              <a:buChar char=""/>
+            </a:pPr>
+            <a:r>
+              <a:rPr b="1" lang="pl-PL" sz="1600">
+                <a:latin typeface="Verdana"/>
+              </a:rPr>
+              <a:t>Akumulator litowo polimerowy </a:t>
+            </a:r>
+            <a:endParaRPr/>
+          </a:p>
+          <a:p>
+            <a:pPr lvl="1">
+              <a:lnSpc>
+                <a:spcPct val="100000"/>
+              </a:lnSpc>
+              <a:buSzPct val="45000"/>
+              <a:buFont typeface="StarSymbol"/>
+              <a:buChar char=""/>
+            </a:pPr>
+            <a:r>
+              <a:rPr b="1" lang="pl-PL" sz="1600">
+                <a:latin typeface="Verdana"/>
+              </a:rPr>
+              <a:t>Dedykowany obwód drukowany</a:t>
+            </a:r>
+            <a:endParaRPr/>
+          </a:p>
+          <a:p>
+            <a:pPr lvl="2">
+              <a:lnSpc>
+                <a:spcPct val="100000"/>
+              </a:lnSpc>
+              <a:buSzPct val="45000"/>
+              <a:buFont typeface="StarSymbol"/>
+              <a:buChar char=""/>
+            </a:pPr>
+            <a:endParaRPr/>
+          </a:p>
+          <a:p>
+            <a:pPr lvl="2">
+              <a:lnSpc>
+                <a:spcPct val="100000"/>
+              </a:lnSpc>
+              <a:buSzPct val="45000"/>
+              <a:buFont typeface="StarSymbol"/>
+              <a:buChar char=""/>
+            </a:pPr>
+            <a:endParaRPr/>
+          </a:p>
+          <a:p>
+            <a:pPr>
+              <a:lnSpc>
+                <a:spcPct val="100000"/>
+              </a:lnSpc>
+            </a:pPr>
+            <a:endParaRPr/>
+          </a:p>
+        </p:txBody>
+      </p:sp>
+      <p:sp>
+        <p:nvSpPr>
+          <p:cNvPr id="63" name="CustomShape 3"/>
+          <p:cNvSpPr/>
+          <p:nvPr/>
+        </p:nvSpPr>
+        <p:spPr>
+          <a:xfrm>
+            <a:off x="7631280" y="6611760"/>
+            <a:ext cx="1512000" cy="260640"/>
+          </a:xfrm>
+          <a:prstGeom prst="rect">
+            <a:avLst/>
+          </a:prstGeom>
+          <a:noFill/>
+          <a:ln>
+            <a:noFill/>
+          </a:ln>
+        </p:spPr>
+        <p:txBody>
+          <a:bodyPr lIns="90000" rIns="90000" tIns="46800" bIns="46800"/>
+          <a:p>
+            <a:pPr>
+              <a:lnSpc>
+                <a:spcPct val="100000"/>
+              </a:lnSpc>
+            </a:pPr>
+            <a:r>
+              <a:rPr b="1" lang="pl-PL" sz="1100">
+                <a:solidFill>
+                  <a:srgbClr val="ffffff"/>
+                </a:solidFill>
+                <a:latin typeface="Verdana"/>
+              </a:rPr>
+              <a:t>www.agh.edu.pl</a:t>
+            </a:r>
+            <a:endParaRPr/>
+          </a:p>
+        </p:txBody>
+      </p:sp>
+    </p:spTree>
+  </p:cSld>
+  <p:timing>
+    <p:tnLst>
+      <p:par>
+        <p:cTn id="17" dur="indefinite" restart="never" nodeType="tmRoot">
+          <p:childTnLst>
+            <p:seq>
+              <p:cTn id="18" nodeType="mainSeq"/>
               <p:prevCondLst>
                 <p:cond delay="0" evt="onPrev">
                   <p:tgtEl>

</xml_diff>